<commit_message>
Update link to RStudio.cloud URL
</commit_message>
<xml_diff>
--- a/slides/000-A-Preclass-loop.pptx
+++ b/slides/000-A-Preclass-loop.pptx
@@ -628,11 +628,11 @@
   <p:clrMapOvr>
     <a:masterClrMapping/>
   </p:clrMapOvr>
-  <mc:AlternateContent xmlns:mc="http://schemas.openxmlformats.org/markup-compatibility/2006">
-    <mc:Choice xmlns:p14="http://schemas.microsoft.com/office/powerpoint/2010/main" Requires="p14">
+  <mc:AlternateContent xmlns:mc="http://schemas.openxmlformats.org/markup-compatibility/2006" xmlns:p14="http://schemas.microsoft.com/office/powerpoint/2010/main">
+    <mc:Choice Requires="p14">
       <p:transition p14:dur="0" advClick="0"/>
     </mc:Choice>
-    <mc:Fallback>
+    <mc:Fallback xmlns="">
       <p:transition advClick="0"/>
     </mc:Fallback>
   </mc:AlternateContent>
@@ -687,7 +687,7 @@
           </a:ln>
           <a:extLst>
             <a:ext uri="{C572A759-6A51-4108-AA02-DFA0A04FC94B}">
-              <ma14:wrappingTextBoxFlag xmlns:ma14="http://schemas.microsoft.com/office/mac/drawingml/2011/main" xmlns="" val="1"/>
+              <ma14:wrappingTextBoxFlag xmlns="" xmlns:ma14="http://schemas.microsoft.com/office/mac/drawingml/2011/main" val="1"/>
             </a:ext>
           </a:extLst>
         </p:spPr>
@@ -726,7 +726,7 @@
           </a:ln>
           <a:extLst>
             <a:ext uri="{C572A759-6A51-4108-AA02-DFA0A04FC94B}">
-              <ma14:wrappingTextBoxFlag xmlns:ma14="http://schemas.microsoft.com/office/mac/drawingml/2011/main" xmlns="" val="1"/>
+              <ma14:wrappingTextBoxFlag xmlns="" xmlns:ma14="http://schemas.microsoft.com/office/mac/drawingml/2011/main" val="1"/>
             </a:ext>
           </a:extLst>
         </p:spPr>
@@ -819,11 +819,11 @@
   <p:sldLayoutIdLst>
     <p:sldLayoutId id="2147483649" r:id="rId1"/>
   </p:sldLayoutIdLst>
-  <mc:AlternateContent xmlns:mc="http://schemas.openxmlformats.org/markup-compatibility/2006">
-    <mc:Choice xmlns:p14="http://schemas.microsoft.com/office/powerpoint/2010/main" Requires="p14">
+  <mc:AlternateContent xmlns:mc="http://schemas.openxmlformats.org/markup-compatibility/2006" xmlns:p14="http://schemas.microsoft.com/office/powerpoint/2010/main">
+    <mc:Choice Requires="p14">
       <p:transition p14:dur="0" advClick="0"/>
     </mc:Choice>
-    <mc:Fallback>
+    <mc:Fallback xmlns="">
       <p:transition advClick="0"/>
     </mc:Fallback>
   </mc:AlternateContent>
@@ -1675,7 +1675,7 @@
           </a:ln>
           <a:extLst>
             <a:ext uri="{C572A759-6A51-4108-AA02-DFA0A04FC94B}">
-              <ma14:wrappingTextBoxFlag xmlns:ma14="http://schemas.microsoft.com/office/mac/drawingml/2011/main" xmlns="" val="1"/>
+              <ma14:wrappingTextBoxFlag xmlns="" xmlns:ma14="http://schemas.microsoft.com/office/mac/drawingml/2011/main" val="1"/>
             </a:ext>
           </a:extLst>
         </p:spPr>
@@ -1726,7 +1726,7 @@
           </a:ln>
           <a:extLst>
             <a:ext uri="{C572A759-6A51-4108-AA02-DFA0A04FC94B}">
-              <ma14:wrappingTextBoxFlag xmlns:ma14="http://schemas.microsoft.com/office/mac/drawingml/2011/main" xmlns="" val="1"/>
+              <ma14:wrappingTextBoxFlag xmlns="" xmlns:ma14="http://schemas.microsoft.com/office/mac/drawingml/2011/main" val="1"/>
             </a:ext>
           </a:extLst>
         </p:spPr>
@@ -1941,13 +1941,13 @@
   <p:clrMapOvr>
     <a:masterClrMapping/>
   </p:clrMapOvr>
-  <mc:AlternateContent xmlns:mc="http://schemas.openxmlformats.org/markup-compatibility/2006">
-    <mc:Choice xmlns:p159="http://schemas.microsoft.com/office/powerpoint/2015/09/main" Requires="p159">
+  <mc:AlternateContent xmlns:mc="http://schemas.openxmlformats.org/markup-compatibility/2006" xmlns:p159="http://schemas.microsoft.com/office/powerpoint/2015/09/main">
+    <mc:Choice Requires="p159">
       <p:transition xmlns:p14="http://schemas.microsoft.com/office/powerpoint/2010/main" spd="slow" p14:dur="2000" advClick="0" advTm="5000">
         <p159:morph option="byObject"/>
       </p:transition>
     </mc:Choice>
-    <mc:Fallback>
+    <mc:Fallback xmlns="">
       <p:transition spd="slow" advClick="0" advTm="5000">
         <p:fade/>
       </p:transition>
@@ -1992,7 +1992,7 @@
           </a:ln>
           <a:extLst>
             <a:ext uri="{C572A759-6A51-4108-AA02-DFA0A04FC94B}">
-              <ma14:wrappingTextBoxFlag xmlns:ma14="http://schemas.microsoft.com/office/mac/drawingml/2011/main" xmlns="" val="1"/>
+              <ma14:wrappingTextBoxFlag xmlns="" xmlns:ma14="http://schemas.microsoft.com/office/mac/drawingml/2011/main" val="1"/>
             </a:ext>
           </a:extLst>
         </p:spPr>
@@ -2043,7 +2043,7 @@
           </a:ln>
           <a:extLst>
             <a:ext uri="{C572A759-6A51-4108-AA02-DFA0A04FC94B}">
-              <ma14:wrappingTextBoxFlag xmlns:ma14="http://schemas.microsoft.com/office/mac/drawingml/2011/main" xmlns="" val="1"/>
+              <ma14:wrappingTextBoxFlag xmlns="" xmlns:ma14="http://schemas.microsoft.com/office/mac/drawingml/2011/main" val="1"/>
             </a:ext>
           </a:extLst>
         </p:spPr>
@@ -2175,13 +2175,13 @@
   <p:clrMapOvr>
     <a:masterClrMapping/>
   </p:clrMapOvr>
-  <mc:AlternateContent xmlns:mc="http://schemas.openxmlformats.org/markup-compatibility/2006">
-    <mc:Choice xmlns:p159="http://schemas.microsoft.com/office/powerpoint/2015/09/main" Requires="p159">
+  <mc:AlternateContent xmlns:mc="http://schemas.openxmlformats.org/markup-compatibility/2006" xmlns:p159="http://schemas.microsoft.com/office/powerpoint/2015/09/main">
+    <mc:Choice Requires="p159">
       <p:transition xmlns:p14="http://schemas.microsoft.com/office/powerpoint/2010/main" spd="slow" p14:dur="2000" advClick="0" advTm="5000">
         <p159:morph option="byObject"/>
       </p:transition>
     </mc:Choice>
-    <mc:Fallback>
+    <mc:Fallback xmlns="">
       <p:transition spd="slow" advClick="0" advTm="5000">
         <p:fade/>
       </p:transition>
@@ -2226,7 +2226,7 @@
           </a:ln>
           <a:extLst>
             <a:ext uri="{C572A759-6A51-4108-AA02-DFA0A04FC94B}">
-              <ma14:wrappingTextBoxFlag xmlns:ma14="http://schemas.microsoft.com/office/mac/drawingml/2011/main" xmlns="" val="1"/>
+              <ma14:wrappingTextBoxFlag xmlns="" xmlns:ma14="http://schemas.microsoft.com/office/mac/drawingml/2011/main" val="1"/>
             </a:ext>
           </a:extLst>
         </p:spPr>
@@ -2266,8 +2266,8 @@
         </p:nvSpPr>
         <p:spPr>
           <a:xfrm>
-            <a:off x="514350" y="5647244"/>
-            <a:ext cx="6322384" cy="3529811"/>
+            <a:off x="514350" y="3954473"/>
+            <a:ext cx="6322384" cy="6915354"/>
           </a:xfrm>
           <a:prstGeom prst="rect">
             <a:avLst/>
@@ -2277,7 +2277,7 @@
           </a:ln>
           <a:extLst>
             <a:ext uri="{C572A759-6A51-4108-AA02-DFA0A04FC94B}">
-              <ma14:wrappingTextBoxFlag xmlns:ma14="http://schemas.microsoft.com/office/mac/drawingml/2011/main" xmlns="" val="1"/>
+              <ma14:wrappingTextBoxFlag xmlns="" xmlns:ma14="http://schemas.microsoft.com/office/mac/drawingml/2011/main" val="1"/>
             </a:ext>
           </a:extLst>
         </p:spPr>
@@ -2305,11 +2305,58 @@
               <a:t>Type this URL into your browser: </a:t>
             </a:r>
             <a:r>
-              <a:rPr lang="en-GB" sz="5500" dirty="0">
+              <a:rPr lang="en-GB" sz="5500" u="sng" dirty="0">
                 <a:sym typeface="Source Sans Pro Light"/>
                 <a:hlinkClick r:id="rId2"/>
               </a:rPr>
-              <a:t>https://rstudio.cloud/project/168691</a:t>
+              <a:t>https://rstudio.cloud/project/702281</a:t>
+            </a:r>
+            <a:endParaRPr lang="en-GB" sz="5500" u="sng" dirty="0">
+              <a:sym typeface="Source Sans Pro Light"/>
+            </a:endParaRPr>
+          </a:p>
+          <a:p>
+            <a:pPr>
+              <a:defRPr sz="5500">
+                <a:latin typeface="Source Sans Pro Light"/>
+                <a:ea typeface="Source Sans Pro Light"/>
+                <a:cs typeface="Source Sans Pro Light"/>
+                <a:sym typeface="Source Sans Pro Light"/>
+              </a:defRPr>
+            </a:pPr>
+            <a:endParaRPr lang="en-GB" sz="5500" u="sng" dirty="0">
+              <a:latin typeface="Source Sans Pro"/>
+              <a:ea typeface="Source Sans Pro"/>
+              <a:cs typeface="Source Sans Pro"/>
+              <a:sym typeface="Source Sans Pro Light"/>
+            </a:endParaRPr>
+          </a:p>
+          <a:p>
+            <a:pPr>
+              <a:defRPr sz="5500">
+                <a:latin typeface="Source Sans Pro Light"/>
+                <a:ea typeface="Source Sans Pro Light"/>
+                <a:cs typeface="Source Sans Pro Light"/>
+                <a:sym typeface="Source Sans Pro Light"/>
+              </a:defRPr>
+            </a:pPr>
+            <a:r>
+              <a:rPr lang="en-GB" sz="5500" u="sng" dirty="0">
+                <a:latin typeface="Source Sans Pro"/>
+                <a:ea typeface="Source Sans Pro"/>
+                <a:cs typeface="Source Sans Pro"/>
+                <a:sym typeface="Source Sans Pro Light"/>
+              </a:rPr>
+              <a:t>NB: Use Chrome or Edge rather than </a:t>
+            </a:r>
+            <a:r>
+              <a:rPr lang="en-GB" sz="5500" u="sng">
+                <a:latin typeface="Source Sans Pro"/>
+                <a:ea typeface="Source Sans Pro"/>
+                <a:cs typeface="Source Sans Pro"/>
+                <a:sym typeface="Source Sans Pro Light"/>
+              </a:rPr>
+              <a:t>Internet Explorer.</a:t>
             </a:r>
             <a:endParaRPr dirty="0">
               <a:latin typeface="Source Sans Pro"/>
@@ -2370,13 +2417,13 @@
   <p:clrMapOvr>
     <a:masterClrMapping/>
   </p:clrMapOvr>
-  <mc:AlternateContent xmlns:mc="http://schemas.openxmlformats.org/markup-compatibility/2006">
-    <mc:Choice xmlns:p159="http://schemas.microsoft.com/office/powerpoint/2015/09/main" Requires="p159">
+  <mc:AlternateContent xmlns:mc="http://schemas.openxmlformats.org/markup-compatibility/2006" xmlns:p159="http://schemas.microsoft.com/office/powerpoint/2015/09/main">
+    <mc:Choice Requires="p159">
       <p:transition xmlns:p14="http://schemas.microsoft.com/office/powerpoint/2010/main" spd="slow" p14:dur="2000" advClick="0" advTm="10000">
         <p159:morph option="byObject"/>
       </p:transition>
     </mc:Choice>
-    <mc:Fallback>
+    <mc:Fallback xmlns="">
       <p:transition spd="slow" advClick="0" advTm="10000">
         <p:fade/>
       </p:transition>
@@ -2421,7 +2468,7 @@
           </a:ln>
           <a:extLst>
             <a:ext uri="{C572A759-6A51-4108-AA02-DFA0A04FC94B}">
-              <ma14:wrappingTextBoxFlag xmlns:ma14="http://schemas.microsoft.com/office/mac/drawingml/2011/main" xmlns="" val="1"/>
+              <ma14:wrappingTextBoxFlag xmlns="" xmlns:ma14="http://schemas.microsoft.com/office/mac/drawingml/2011/main" val="1"/>
             </a:ext>
           </a:extLst>
         </p:spPr>
@@ -2472,7 +2519,7 @@
           </a:ln>
           <a:extLst>
             <a:ext uri="{C572A759-6A51-4108-AA02-DFA0A04FC94B}">
-              <ma14:wrappingTextBoxFlag xmlns:ma14="http://schemas.microsoft.com/office/mac/drawingml/2011/main" xmlns="" val="1"/>
+              <ma14:wrappingTextBoxFlag xmlns="" xmlns:ma14="http://schemas.microsoft.com/office/mac/drawingml/2011/main" val="1"/>
             </a:ext>
           </a:extLst>
         </p:spPr>
@@ -2681,13 +2728,13 @@
   <p:clrMapOvr>
     <a:masterClrMapping/>
   </p:clrMapOvr>
-  <mc:AlternateContent xmlns:mc="http://schemas.openxmlformats.org/markup-compatibility/2006">
-    <mc:Choice xmlns:p159="http://schemas.microsoft.com/office/powerpoint/2015/09/main" Requires="p159">
+  <mc:AlternateContent xmlns:mc="http://schemas.openxmlformats.org/markup-compatibility/2006" xmlns:p159="http://schemas.microsoft.com/office/powerpoint/2015/09/main">
+    <mc:Choice Requires="p159">
       <p:transition xmlns:p14="http://schemas.microsoft.com/office/powerpoint/2010/main" spd="slow" p14:dur="2000" advClick="0" advTm="5000">
         <p159:morph option="byObject"/>
       </p:transition>
     </mc:Choice>
-    <mc:Fallback>
+    <mc:Fallback xmlns="">
       <p:transition spd="slow" advClick="0" advTm="5000">
         <p:fade/>
       </p:transition>
@@ -2723,13 +2770,13 @@
   <p:clrMapOvr>
     <a:masterClrMapping/>
   </p:clrMapOvr>
-  <mc:AlternateContent xmlns:mc="http://schemas.openxmlformats.org/markup-compatibility/2006">
-    <mc:Choice xmlns:p14="http://schemas.microsoft.com/office/powerpoint/2010/main" Requires="p14">
+  <mc:AlternateContent xmlns:mc="http://schemas.openxmlformats.org/markup-compatibility/2006" xmlns:p14="http://schemas.microsoft.com/office/powerpoint/2010/main">
+    <mc:Choice Requires="p14">
       <p:transition spd="med" p14:dur="700" advClick="0" advTm="2000">
         <p:fade/>
       </p:transition>
     </mc:Choice>
-    <mc:Fallback>
+    <mc:Fallback xmlns="">
       <p:transition spd="med" advClick="0" advTm="2000">
         <p:fade/>
       </p:transition>

</xml_diff>